<commit_message>
Add report for task 1.2
</commit_message>
<xml_diff>
--- a/lab_1/task_2/task_2.pptx
+++ b/lab_1/task_2/task_2.pptx
@@ -244,7 +244,7 @@
           <a:p>
             <a:fld id="{849C51D8-03A4-AA43-88E5-6FBB93E7B8C5}" type="datetimeFigureOut">
               <a:rPr lang="en-US" smtClean="0"/>
-              <a:t>11/6/25</a:t>
+              <a:t>11/7/25</a:t>
             </a:fld>
             <a:endParaRPr lang="en-US"/>
           </a:p>
@@ -414,7 +414,7 @@
           <a:p>
             <a:fld id="{849C51D8-03A4-AA43-88E5-6FBB93E7B8C5}" type="datetimeFigureOut">
               <a:rPr lang="en-US" smtClean="0"/>
-              <a:t>11/6/25</a:t>
+              <a:t>11/7/25</a:t>
             </a:fld>
             <a:endParaRPr lang="en-US"/>
           </a:p>
@@ -594,7 +594,7 @@
           <a:p>
             <a:fld id="{849C51D8-03A4-AA43-88E5-6FBB93E7B8C5}" type="datetimeFigureOut">
               <a:rPr lang="en-US" smtClean="0"/>
-              <a:t>11/6/25</a:t>
+              <a:t>11/7/25</a:t>
             </a:fld>
             <a:endParaRPr lang="en-US"/>
           </a:p>
@@ -764,7 +764,7 @@
           <a:p>
             <a:fld id="{849C51D8-03A4-AA43-88E5-6FBB93E7B8C5}" type="datetimeFigureOut">
               <a:rPr lang="en-US" smtClean="0"/>
-              <a:t>11/6/25</a:t>
+              <a:t>11/7/25</a:t>
             </a:fld>
             <a:endParaRPr lang="en-US"/>
           </a:p>
@@ -1010,7 +1010,7 @@
           <a:p>
             <a:fld id="{849C51D8-03A4-AA43-88E5-6FBB93E7B8C5}" type="datetimeFigureOut">
               <a:rPr lang="en-US" smtClean="0"/>
-              <a:t>11/6/25</a:t>
+              <a:t>11/7/25</a:t>
             </a:fld>
             <a:endParaRPr lang="en-US"/>
           </a:p>
@@ -1242,7 +1242,7 @@
           <a:p>
             <a:fld id="{849C51D8-03A4-AA43-88E5-6FBB93E7B8C5}" type="datetimeFigureOut">
               <a:rPr lang="en-US" smtClean="0"/>
-              <a:t>11/6/25</a:t>
+              <a:t>11/7/25</a:t>
             </a:fld>
             <a:endParaRPr lang="en-US"/>
           </a:p>
@@ -1609,7 +1609,7 @@
           <a:p>
             <a:fld id="{849C51D8-03A4-AA43-88E5-6FBB93E7B8C5}" type="datetimeFigureOut">
               <a:rPr lang="en-US" smtClean="0"/>
-              <a:t>11/6/25</a:t>
+              <a:t>11/7/25</a:t>
             </a:fld>
             <a:endParaRPr lang="en-US"/>
           </a:p>
@@ -1727,7 +1727,7 @@
           <a:p>
             <a:fld id="{849C51D8-03A4-AA43-88E5-6FBB93E7B8C5}" type="datetimeFigureOut">
               <a:rPr lang="en-US" smtClean="0"/>
-              <a:t>11/6/25</a:t>
+              <a:t>11/7/25</a:t>
             </a:fld>
             <a:endParaRPr lang="en-US"/>
           </a:p>
@@ -1822,7 +1822,7 @@
           <a:p>
             <a:fld id="{849C51D8-03A4-AA43-88E5-6FBB93E7B8C5}" type="datetimeFigureOut">
               <a:rPr lang="en-US" smtClean="0"/>
-              <a:t>11/6/25</a:t>
+              <a:t>11/7/25</a:t>
             </a:fld>
             <a:endParaRPr lang="en-US"/>
           </a:p>
@@ -2099,7 +2099,7 @@
           <a:p>
             <a:fld id="{849C51D8-03A4-AA43-88E5-6FBB93E7B8C5}" type="datetimeFigureOut">
               <a:rPr lang="en-US" smtClean="0"/>
-              <a:t>11/6/25</a:t>
+              <a:t>11/7/25</a:t>
             </a:fld>
             <a:endParaRPr lang="en-US"/>
           </a:p>
@@ -2356,7 +2356,7 @@
           <a:p>
             <a:fld id="{849C51D8-03A4-AA43-88E5-6FBB93E7B8C5}" type="datetimeFigureOut">
               <a:rPr lang="en-US" smtClean="0"/>
-              <a:t>11/6/25</a:t>
+              <a:t>11/7/25</a:t>
             </a:fld>
             <a:endParaRPr lang="en-US"/>
           </a:p>
@@ -2569,7 +2569,7 @@
           <a:p>
             <a:fld id="{849C51D8-03A4-AA43-88E5-6FBB93E7B8C5}" type="datetimeFigureOut">
               <a:rPr lang="en-US" smtClean="0"/>
-              <a:t>11/6/25</a:t>
+              <a:t>11/7/25</a:t>
             </a:fld>
             <a:endParaRPr lang="en-US"/>
           </a:p>
@@ -3896,7 +3896,7 @@
             </a:r>
             <a:r>
               <a:rPr lang="pl-PL" sz="1200" dirty="0"/>
-              <a:t> != „(”</a:t>
+              <a:t> &lt;&gt; „(”</a:t>
             </a:r>
           </a:p>
         </p:txBody>

</xml_diff>